<commit_message>
BDL2024 10 - Blockchain Applications.pptx
</commit_message>
<xml_diff>
--- a/BDL2024 09 - Secure Multiparty Computation.pptx
+++ b/BDL2024 09 - Secure Multiparty Computation.pptx
@@ -309,6 +309,11 @@
       </a:defRPr>
     </a:lvl9pPr>
   </p:defaultTextStyle>
+  <p:extLst>
+    <p:ext uri="{EFAFB233-063F-42B5-8137-9DF3F51BA10A}">
+      <p15:sldGuideLst xmlns:p15="http://schemas.microsoft.com/office/powerpoint/2012/main"/>
+    </p:ext>
+  </p:extLst>
 </p:presentation>
 </file>
 
@@ -6086,7 +6091,7 @@
         </p:nvSpPr>
         <p:spPr>
           <a:xfrm>
-            <a:off x="381300" y="685800"/>
+            <a:off x="381000" y="685800"/>
             <a:ext cx="6096000" cy="3429000"/>
           </a:xfrm>
           <a:custGeom>
@@ -44560,7 +44565,7 @@
               <a:buChar char="●"/>
             </a:pPr>
             <a:r>
-              <a:rPr lang="en">
+              <a:rPr lang="en" dirty="0">
                 <a:solidFill>
                   <a:schemeClr val="dk1"/>
                 </a:solidFill>
@@ -44572,7 +44577,7 @@
               <a:t>Finite </a:t>
             </a:r>
             <a:r>
-              <a:rPr lang="en" i="1">
+              <a:rPr lang="en" i="1" dirty="0">
                 <a:solidFill>
                   <a:schemeClr val="dk1"/>
                 </a:solidFill>
@@ -44584,7 +44589,7 @@
               <a:t>sets</a:t>
             </a:r>
             <a:r>
-              <a:rPr lang="en">
+              <a:rPr lang="en" dirty="0">
                 <a:solidFill>
                   <a:schemeClr val="dk1"/>
                 </a:solidFill>
@@ -44596,7 +44601,7 @@
               <a:t> equipped with </a:t>
             </a:r>
             <a:r>
-              <a:rPr lang="en" i="1">
+              <a:rPr lang="en" i="1" dirty="0">
                 <a:solidFill>
                   <a:schemeClr val="dk1"/>
                 </a:solidFill>
@@ -44608,7 +44613,7 @@
               <a:t>two operations</a:t>
             </a:r>
             <a:r>
-              <a:rPr lang="en">
+              <a:rPr lang="en" dirty="0">
                 <a:solidFill>
                   <a:schemeClr val="dk1"/>
                 </a:solidFill>
@@ -44619,7 +44624,7 @@
               </a:rPr>
               <a:t>, behaving similarly to addition and multiplication over the real numbers (which is an infinite field)</a:t>
             </a:r>
-            <a:endParaRPr>
+            <a:endParaRPr dirty="0">
               <a:solidFill>
                 <a:schemeClr val="dk1"/>
               </a:solidFill>
@@ -44645,7 +44650,7 @@
               <a:buChar char="●"/>
             </a:pPr>
             <a:r>
-              <a:rPr lang="en">
+              <a:rPr lang="en" dirty="0">
                 <a:solidFill>
                   <a:schemeClr val="dk1"/>
                 </a:solidFill>
@@ -44657,7 +44662,7 @@
               <a:t>Finite fields exist with number of elements equal to p</a:t>
             </a:r>
             <a:r>
-              <a:rPr lang="en" baseline="30000">
+              <a:rPr lang="en" baseline="30000" dirty="0">
                 <a:solidFill>
                   <a:schemeClr val="dk1"/>
                 </a:solidFill>
@@ -44669,7 +44674,7 @@
               <a:t>k</a:t>
             </a:r>
             <a:r>
-              <a:rPr lang="en">
+              <a:rPr lang="en" dirty="0">
                 <a:solidFill>
                   <a:schemeClr val="dk1"/>
                 </a:solidFill>
@@ -44680,7 +44685,7 @@
               </a:rPr>
               <a:t>, for:</a:t>
             </a:r>
-            <a:endParaRPr>
+            <a:endParaRPr dirty="0">
               <a:solidFill>
                 <a:schemeClr val="dk1"/>
               </a:solidFill>
@@ -44706,7 +44711,7 @@
               <a:buChar char="○"/>
             </a:pPr>
             <a:r>
-              <a:rPr lang="en">
+              <a:rPr lang="en" dirty="0">
                 <a:solidFill>
                   <a:schemeClr val="dk1"/>
                 </a:solidFill>
@@ -44717,7 +44722,7 @@
               </a:rPr>
               <a:t>any prime number p</a:t>
             </a:r>
-            <a:endParaRPr>
+            <a:endParaRPr dirty="0">
               <a:solidFill>
                 <a:schemeClr val="dk1"/>
               </a:solidFill>
@@ -44743,7 +44748,7 @@
               <a:buChar char="○"/>
             </a:pPr>
             <a:r>
-              <a:rPr lang="en">
+              <a:rPr lang="en" dirty="0">
                 <a:solidFill>
                   <a:schemeClr val="dk1"/>
                 </a:solidFill>
@@ -44754,7 +44759,7 @@
               </a:rPr>
               <a:t>any positive integer k</a:t>
             </a:r>
-            <a:endParaRPr i="1">
+            <a:endParaRPr i="1" dirty="0">
               <a:solidFill>
                 <a:schemeClr val="dk1"/>
               </a:solidFill>
@@ -44774,7 +44779,7 @@
               </a:spcAft>
               <a:buNone/>
             </a:pPr>
-            <a:endParaRPr i="1">
+            <a:endParaRPr i="1" dirty="0">
               <a:solidFill>
                 <a:schemeClr val="dk1"/>
               </a:solidFill>
@@ -44795,7 +44800,7 @@
               <a:buNone/>
             </a:pPr>
             <a:r>
-              <a:rPr lang="en" i="1">
+              <a:rPr lang="en" i="1" dirty="0">
                 <a:solidFill>
                   <a:schemeClr val="dk1"/>
                 </a:solidFill>
@@ -44807,7 +44812,7 @@
               <a:t>Example</a:t>
             </a:r>
             <a:r>
-              <a:rPr lang="en">
+              <a:rPr lang="en" dirty="0">
                 <a:solidFill>
                   <a:schemeClr val="dk1"/>
                 </a:solidFill>
@@ -44818,7 +44823,7 @@
               </a:rPr>
               <a:t>. A binary finite field {0, 1} with: </a:t>
             </a:r>
-            <a:endParaRPr>
+            <a:endParaRPr dirty="0">
               <a:solidFill>
                 <a:schemeClr val="dk1"/>
               </a:solidFill>
@@ -44838,7 +44843,7 @@
               </a:spcAft>
               <a:buNone/>
             </a:pPr>
-            <a:endParaRPr>
+            <a:endParaRPr dirty="0">
               <a:solidFill>
                 <a:schemeClr val="dk1"/>
               </a:solidFill>
@@ -44900,7 +44905,7 @@
         </p:nvSpPr>
         <p:spPr>
           <a:xfrm>
-            <a:off x="5050250" y="2945350"/>
+            <a:off x="4313338" y="4038400"/>
             <a:ext cx="3274200" cy="1159200"/>
           </a:xfrm>
           <a:prstGeom prst="rect">
@@ -44927,7 +44932,7 @@
               <a:buNone/>
             </a:pPr>
             <a:r>
-              <a:rPr lang="en">
+              <a:rPr lang="en" dirty="0">
                 <a:latin typeface="Ubuntu"/>
                 <a:ea typeface="Ubuntu"/>
                 <a:cs typeface="Ubuntu"/>
@@ -44935,7 +44940,7 @@
               </a:rPr>
               <a:t>+	0	1</a:t>
             </a:r>
-            <a:endParaRPr>
+            <a:endParaRPr dirty="0">
               <a:latin typeface="Ubuntu"/>
               <a:ea typeface="Ubuntu"/>
               <a:cs typeface="Ubuntu"/>
@@ -44953,7 +44958,7 @@
               <a:buNone/>
             </a:pPr>
             <a:r>
-              <a:rPr lang="en">
+              <a:rPr lang="en" dirty="0">
                 <a:latin typeface="Ubuntu"/>
                 <a:ea typeface="Ubuntu"/>
                 <a:cs typeface="Ubuntu"/>
@@ -44961,7 +44966,7 @@
               </a:rPr>
               <a:t>0	0	1</a:t>
             </a:r>
-            <a:endParaRPr>
+            <a:endParaRPr dirty="0">
               <a:latin typeface="Ubuntu"/>
               <a:ea typeface="Ubuntu"/>
               <a:cs typeface="Ubuntu"/>
@@ -44979,7 +44984,7 @@
               <a:buNone/>
             </a:pPr>
             <a:r>
-              <a:rPr lang="en">
+              <a:rPr lang="en" dirty="0">
                 <a:latin typeface="Ubuntu"/>
                 <a:ea typeface="Ubuntu"/>
                 <a:cs typeface="Ubuntu"/>
@@ -44987,7 +44992,7 @@
               </a:rPr>
               <a:t>1 	1	0</a:t>
             </a:r>
-            <a:endParaRPr>
+            <a:endParaRPr dirty="0">
               <a:latin typeface="Ubuntu"/>
               <a:ea typeface="Ubuntu"/>
               <a:cs typeface="Ubuntu"/>
@@ -45108,7 +45113,7 @@
         </p:nvCxnSpPr>
         <p:spPr>
           <a:xfrm>
-            <a:off x="5013675" y="3243000"/>
+            <a:off x="4276763" y="4336050"/>
             <a:ext cx="1269000" cy="5100"/>
           </a:xfrm>
           <a:prstGeom prst="straightConnector1">
@@ -45186,7 +45191,7 @@
         </p:nvCxnSpPr>
         <p:spPr>
           <a:xfrm>
-            <a:off x="5416725" y="3086350"/>
+            <a:off x="4679813" y="4179400"/>
             <a:ext cx="10500" cy="621300"/>
           </a:xfrm>
           <a:prstGeom prst="straightConnector1">
@@ -45212,7 +45217,7 @@
         </p:nvSpPr>
         <p:spPr>
           <a:xfrm>
-            <a:off x="5143075" y="3824725"/>
+            <a:off x="4911263" y="3676300"/>
             <a:ext cx="3007800" cy="351000"/>
           </a:xfrm>
           <a:prstGeom prst="rect">
@@ -45239,15 +45244,33 @@
               <a:buNone/>
             </a:pPr>
             <a:r>
-              <a:rPr lang="en">
+              <a:rPr lang="en" dirty="0">
                 <a:latin typeface="Ubuntu"/>
                 <a:ea typeface="Ubuntu"/>
                 <a:cs typeface="Ubuntu"/>
                 <a:sym typeface="Ubuntu"/>
               </a:rPr>
-              <a:t>(a+b) mod 2</a:t>
-            </a:r>
-            <a:endParaRPr>
+              <a:t>(</a:t>
+            </a:r>
+            <a:r>
+              <a:rPr lang="en" dirty="0" err="1">
+                <a:latin typeface="Ubuntu"/>
+                <a:ea typeface="Ubuntu"/>
+                <a:cs typeface="Ubuntu"/>
+                <a:sym typeface="Ubuntu"/>
+              </a:rPr>
+              <a:t>a+b</a:t>
+            </a:r>
+            <a:r>
+              <a:rPr lang="en" dirty="0">
+                <a:latin typeface="Ubuntu"/>
+                <a:ea typeface="Ubuntu"/>
+                <a:cs typeface="Ubuntu"/>
+                <a:sym typeface="Ubuntu"/>
+              </a:rPr>
+              <a:t>) mod 2</a:t>
+            </a:r>
+            <a:endParaRPr dirty="0">
               <a:latin typeface="Ubuntu"/>
               <a:ea typeface="Ubuntu"/>
               <a:cs typeface="Ubuntu"/>

</xml_diff>